<commit_message>
Expanded the chapter on the Grover search algorithm. Implemented an error model for the Grover algorithm and made a numerical fit of the error parameters to the experimentially measured density matrices. Analyzed different error sources in the algorithm and the fidelity of the oracle and diffusion operators.
</commit_message>
<xml_diff>
--- a/material/papers/grover/classical_reversible_algorithm.pptx
+++ b/material/papers/grover/classical_reversible_algorithm.pptx
@@ -9,6 +9,7 @@
     <p:sldId id="258" r:id="rId3"/>
     <p:sldId id="259" r:id="rId4"/>
     <p:sldId id="257" r:id="rId5"/>
+    <p:sldId id="260" r:id="rId6"/>
   </p:sldIdLst>
   <p:sldSz cx="9144000" cy="6858000" type="screen4x3"/>
   <p:notesSz cx="6858000" cy="9144000"/>
@@ -292,7 +293,7 @@
             <a:fld id="{7A68A57C-3EBA-40C1-9071-8CC5E80F3BD3}" type="datetimeFigureOut">
               <a:rPr lang="de-DE" smtClean="0"/>
               <a:pPr/>
-              <a:t>26.04.2012</a:t>
+              <a:t>03.05.2012</a:t>
             </a:fld>
             <a:endParaRPr lang="de-DE"/>
           </a:p>
@@ -459,7 +460,7 @@
             <a:fld id="{7A68A57C-3EBA-40C1-9071-8CC5E80F3BD3}" type="datetimeFigureOut">
               <a:rPr lang="de-DE" smtClean="0"/>
               <a:pPr/>
-              <a:t>26.04.2012</a:t>
+              <a:t>03.05.2012</a:t>
             </a:fld>
             <a:endParaRPr lang="de-DE"/>
           </a:p>
@@ -636,7 +637,7 @@
             <a:fld id="{7A68A57C-3EBA-40C1-9071-8CC5E80F3BD3}" type="datetimeFigureOut">
               <a:rPr lang="de-DE" smtClean="0"/>
               <a:pPr/>
-              <a:t>26.04.2012</a:t>
+              <a:t>03.05.2012</a:t>
             </a:fld>
             <a:endParaRPr lang="de-DE"/>
           </a:p>
@@ -803,7 +804,7 @@
             <a:fld id="{7A68A57C-3EBA-40C1-9071-8CC5E80F3BD3}" type="datetimeFigureOut">
               <a:rPr lang="de-DE" smtClean="0"/>
               <a:pPr/>
-              <a:t>26.04.2012</a:t>
+              <a:t>03.05.2012</a:t>
             </a:fld>
             <a:endParaRPr lang="de-DE"/>
           </a:p>
@@ -1046,7 +1047,7 @@
             <a:fld id="{7A68A57C-3EBA-40C1-9071-8CC5E80F3BD3}" type="datetimeFigureOut">
               <a:rPr lang="de-DE" smtClean="0"/>
               <a:pPr/>
-              <a:t>26.04.2012</a:t>
+              <a:t>03.05.2012</a:t>
             </a:fld>
             <a:endParaRPr lang="de-DE"/>
           </a:p>
@@ -1331,7 +1332,7 @@
             <a:fld id="{7A68A57C-3EBA-40C1-9071-8CC5E80F3BD3}" type="datetimeFigureOut">
               <a:rPr lang="de-DE" smtClean="0"/>
               <a:pPr/>
-              <a:t>26.04.2012</a:t>
+              <a:t>03.05.2012</a:t>
             </a:fld>
             <a:endParaRPr lang="de-DE"/>
           </a:p>
@@ -1750,7 +1751,7 @@
             <a:fld id="{7A68A57C-3EBA-40C1-9071-8CC5E80F3BD3}" type="datetimeFigureOut">
               <a:rPr lang="de-DE" smtClean="0"/>
               <a:pPr/>
-              <a:t>26.04.2012</a:t>
+              <a:t>03.05.2012</a:t>
             </a:fld>
             <a:endParaRPr lang="de-DE"/>
           </a:p>
@@ -1865,7 +1866,7 @@
             <a:fld id="{7A68A57C-3EBA-40C1-9071-8CC5E80F3BD3}" type="datetimeFigureOut">
               <a:rPr lang="de-DE" smtClean="0"/>
               <a:pPr/>
-              <a:t>26.04.2012</a:t>
+              <a:t>03.05.2012</a:t>
             </a:fld>
             <a:endParaRPr lang="de-DE"/>
           </a:p>
@@ -1957,7 +1958,7 @@
             <a:fld id="{7A68A57C-3EBA-40C1-9071-8CC5E80F3BD3}" type="datetimeFigureOut">
               <a:rPr lang="de-DE" smtClean="0"/>
               <a:pPr/>
-              <a:t>26.04.2012</a:t>
+              <a:t>03.05.2012</a:t>
             </a:fld>
             <a:endParaRPr lang="de-DE"/>
           </a:p>
@@ -2231,7 +2232,7 @@
             <a:fld id="{7A68A57C-3EBA-40C1-9071-8CC5E80F3BD3}" type="datetimeFigureOut">
               <a:rPr lang="de-DE" smtClean="0"/>
               <a:pPr/>
-              <a:t>26.04.2012</a:t>
+              <a:t>03.05.2012</a:t>
             </a:fld>
             <a:endParaRPr lang="de-DE"/>
           </a:p>
@@ -2481,7 +2482,7 @@
             <a:fld id="{7A68A57C-3EBA-40C1-9071-8CC5E80F3BD3}" type="datetimeFigureOut">
               <a:rPr lang="de-DE" smtClean="0"/>
               <a:pPr/>
-              <a:t>26.04.2012</a:t>
+              <a:t>03.05.2012</a:t>
             </a:fld>
             <a:endParaRPr lang="de-DE"/>
           </a:p>
@@ -2691,7 +2692,7 @@
             <a:fld id="{7A68A57C-3EBA-40C1-9071-8CC5E80F3BD3}" type="datetimeFigureOut">
               <a:rPr lang="de-DE" smtClean="0"/>
               <a:pPr/>
-              <a:t>26.04.2012</a:t>
+              <a:t>03.05.2012</a:t>
             </a:fld>
             <a:endParaRPr lang="de-DE"/>
           </a:p>
@@ -7920,15 +7921,7 @@
                   <a:schemeClr val="tx1"/>
                 </a:solidFill>
               </a:rPr>
-              <a:t> </a:t>
-            </a:r>
-            <a:r>
-              <a:rPr lang="el-GR" b="1" baseline="-25000" dirty="0" smtClean="0">
-                <a:solidFill>
-                  <a:schemeClr val="tx1"/>
-                </a:solidFill>
-              </a:rPr>
-              <a:t>π</a:t>
+              <a:t> π</a:t>
             </a:r>
             <a:r>
               <a:rPr lang="de-DE" b="1" baseline="-25000" dirty="0" smtClean="0">
@@ -12020,11 +12013,7 @@
           <a:p>
             <a:r>
               <a:rPr lang="de-DE" sz="1600" dirty="0" smtClean="0"/>
-              <a:t>Oracle (</a:t>
-            </a:r>
-            <a:r>
-              <a:rPr lang="de-DE" sz="1600" dirty="0" smtClean="0"/>
-              <a:t>01)</a:t>
+              <a:t>Oracle (01)</a:t>
             </a:r>
             <a:endParaRPr lang="de-DE" sz="1600" dirty="0"/>
           </a:p>
@@ -12673,15 +12662,7 @@
           <a:p>
             <a:r>
               <a:rPr lang="de-DE" sz="1600" dirty="0" smtClean="0"/>
-              <a:t>Oracle </a:t>
-            </a:r>
-            <a:r>
-              <a:rPr lang="de-DE" sz="1600" dirty="0" smtClean="0"/>
-              <a:t>(10</a:t>
-            </a:r>
-            <a:r>
-              <a:rPr lang="de-DE" sz="1600" dirty="0" smtClean="0"/>
-              <a:t>)</a:t>
+              <a:t>Oracle (10)</a:t>
             </a:r>
             <a:endParaRPr lang="de-DE" sz="1600" dirty="0"/>
           </a:p>
@@ -13152,11 +13133,7 @@
           <a:p>
             <a:r>
               <a:rPr lang="de-DE" sz="1600" dirty="0" smtClean="0"/>
-              <a:t>Oracle </a:t>
-            </a:r>
-            <a:r>
-              <a:rPr lang="de-DE" sz="1600" dirty="0" smtClean="0"/>
-              <a:t>(11)</a:t>
+              <a:t>Oracle (11)</a:t>
             </a:r>
             <a:endParaRPr lang="de-DE" sz="1600" dirty="0"/>
           </a:p>
@@ -13918,15 +13895,7 @@
                   <a:schemeClr val="tx1"/>
                 </a:solidFill>
               </a:rPr>
-              <a:t> </a:t>
-            </a:r>
-            <a:r>
-              <a:rPr lang="el-GR" b="1" baseline="-25000" dirty="0" smtClean="0">
-                <a:solidFill>
-                  <a:schemeClr val="tx1"/>
-                </a:solidFill>
-              </a:rPr>
-              <a:t>π</a:t>
+              <a:t> π</a:t>
             </a:r>
             <a:r>
               <a:rPr lang="de-DE" b="1" baseline="-25000" dirty="0" smtClean="0">
@@ -14750,6 +14719,1983 @@
           </a:p>
         </p:txBody>
       </p:sp>
+    </p:spTree>
+  </p:cSld>
+  <p:clrMapOvr>
+    <a:masterClrMapping/>
+  </p:clrMapOvr>
+</p:sld>
+</file>
+
+<file path=ppt/slides/slide5.xml><?xml version="1.0" encoding="utf-8"?>
+<p:sld xmlns:a="http://schemas.openxmlformats.org/drawingml/2006/main" xmlns:r="http://schemas.openxmlformats.org/officeDocument/2006/relationships" xmlns:p="http://schemas.openxmlformats.org/presentationml/2006/main">
+  <p:cSld>
+    <p:spTree>
+      <p:nvGrpSpPr>
+        <p:cNvPr id="1" name=""/>
+        <p:cNvGrpSpPr/>
+        <p:nvPr/>
+      </p:nvGrpSpPr>
+      <p:grpSpPr>
+        <a:xfrm>
+          <a:off x="0" y="0"/>
+          <a:ext cx="0" cy="0"/>
+          <a:chOff x="0" y="0"/>
+          <a:chExt cx="0" cy="0"/>
+        </a:xfrm>
+      </p:grpSpPr>
+      <p:cxnSp>
+        <p:nvCxnSpPr>
+          <p:cNvPr id="36" name="Gerade Verbindung 35"/>
+          <p:cNvCxnSpPr/>
+          <p:nvPr/>
+        </p:nvCxnSpPr>
+        <p:spPr>
+          <a:xfrm>
+            <a:off x="611560" y="3861048"/>
+            <a:ext cx="5616624" cy="0"/>
+          </a:xfrm>
+          <a:prstGeom prst="line">
+            <a:avLst/>
+          </a:prstGeom>
+          <a:ln w="19050">
+            <a:solidFill>
+              <a:schemeClr val="tx1"/>
+            </a:solidFill>
+          </a:ln>
+        </p:spPr>
+        <p:style>
+          <a:lnRef idx="1">
+            <a:schemeClr val="accent1"/>
+          </a:lnRef>
+          <a:fillRef idx="0">
+            <a:schemeClr val="accent1"/>
+          </a:fillRef>
+          <a:effectRef idx="0">
+            <a:schemeClr val="accent1"/>
+          </a:effectRef>
+          <a:fontRef idx="minor">
+            <a:schemeClr val="tx1"/>
+          </a:fontRef>
+        </p:style>
+      </p:cxnSp>
+      <p:cxnSp>
+        <p:nvCxnSpPr>
+          <p:cNvPr id="37" name="Gerade Verbindung 36"/>
+          <p:cNvCxnSpPr/>
+          <p:nvPr/>
+        </p:nvCxnSpPr>
+        <p:spPr>
+          <a:xfrm>
+            <a:off x="539552" y="4653136"/>
+            <a:ext cx="5688632" cy="0"/>
+          </a:xfrm>
+          <a:prstGeom prst="line">
+            <a:avLst/>
+          </a:prstGeom>
+          <a:ln w="19050">
+            <a:solidFill>
+              <a:schemeClr val="tx1"/>
+            </a:solidFill>
+          </a:ln>
+        </p:spPr>
+        <p:style>
+          <a:lnRef idx="1">
+            <a:schemeClr val="accent1"/>
+          </a:lnRef>
+          <a:fillRef idx="0">
+            <a:schemeClr val="accent1"/>
+          </a:fillRef>
+          <a:effectRef idx="0">
+            <a:schemeClr val="accent1"/>
+          </a:effectRef>
+          <a:fontRef idx="minor">
+            <a:schemeClr val="tx1"/>
+          </a:fontRef>
+        </p:style>
+      </p:cxnSp>
+      <p:sp>
+        <p:nvSpPr>
+          <p:cNvPr id="38" name="Rechteck 37"/>
+          <p:cNvSpPr/>
+          <p:nvPr/>
+        </p:nvSpPr>
+        <p:spPr>
+          <a:xfrm>
+            <a:off x="179512" y="3577498"/>
+            <a:ext cx="576064" cy="571582"/>
+          </a:xfrm>
+          <a:prstGeom prst="rect">
+            <a:avLst/>
+          </a:prstGeom>
+          <a:solidFill>
+            <a:schemeClr val="bg1"/>
+          </a:solidFill>
+          <a:ln>
+            <a:solidFill>
+              <a:schemeClr val="tx1"/>
+            </a:solidFill>
+          </a:ln>
+        </p:spPr>
+        <p:style>
+          <a:lnRef idx="2">
+            <a:schemeClr val="accent1">
+              <a:shade val="50000"/>
+            </a:schemeClr>
+          </a:lnRef>
+          <a:fillRef idx="1">
+            <a:schemeClr val="accent1"/>
+          </a:fillRef>
+          <a:effectRef idx="0">
+            <a:schemeClr val="accent1"/>
+          </a:effectRef>
+          <a:fontRef idx="minor">
+            <a:schemeClr val="lt1"/>
+          </a:fontRef>
+        </p:style>
+        <p:txBody>
+          <a:bodyPr rtlCol="0" anchor="ctr"/>
+          <a:lstStyle/>
+          <a:p>
+            <a:pPr algn="ctr"/>
+            <a:r>
+              <a:rPr lang="de-DE" b="1" dirty="0" smtClean="0">
+                <a:solidFill>
+                  <a:schemeClr val="tx1"/>
+                </a:solidFill>
+              </a:rPr>
+              <a:t>|0&gt;</a:t>
+            </a:r>
+            <a:endParaRPr lang="de-DE" b="1" dirty="0">
+              <a:solidFill>
+                <a:schemeClr val="tx1"/>
+              </a:solidFill>
+            </a:endParaRPr>
+          </a:p>
+        </p:txBody>
+      </p:sp>
+      <p:sp>
+        <p:nvSpPr>
+          <p:cNvPr id="39" name="Rechteck 38"/>
+          <p:cNvSpPr/>
+          <p:nvPr/>
+        </p:nvSpPr>
+        <p:spPr>
+          <a:xfrm>
+            <a:off x="179512" y="4365104"/>
+            <a:ext cx="576064" cy="576064"/>
+          </a:xfrm>
+          <a:prstGeom prst="rect">
+            <a:avLst/>
+          </a:prstGeom>
+          <a:solidFill>
+            <a:schemeClr val="bg1"/>
+          </a:solidFill>
+          <a:ln>
+            <a:solidFill>
+              <a:schemeClr val="tx1"/>
+            </a:solidFill>
+          </a:ln>
+        </p:spPr>
+        <p:style>
+          <a:lnRef idx="2">
+            <a:schemeClr val="accent1">
+              <a:shade val="50000"/>
+            </a:schemeClr>
+          </a:lnRef>
+          <a:fillRef idx="1">
+            <a:schemeClr val="accent1"/>
+          </a:fillRef>
+          <a:effectRef idx="0">
+            <a:schemeClr val="accent1"/>
+          </a:effectRef>
+          <a:fontRef idx="minor">
+            <a:schemeClr val="lt1"/>
+          </a:fontRef>
+        </p:style>
+        <p:txBody>
+          <a:bodyPr rtlCol="0" anchor="ctr"/>
+          <a:lstStyle/>
+          <a:p>
+            <a:pPr algn="ctr"/>
+            <a:r>
+              <a:rPr lang="de-DE" b="1" dirty="0" smtClean="0">
+                <a:solidFill>
+                  <a:schemeClr val="tx1"/>
+                </a:solidFill>
+              </a:rPr>
+              <a:t>|0&gt;</a:t>
+            </a:r>
+            <a:endParaRPr lang="de-DE" b="1" dirty="0">
+              <a:solidFill>
+                <a:schemeClr val="tx1"/>
+              </a:solidFill>
+            </a:endParaRPr>
+          </a:p>
+        </p:txBody>
+      </p:sp>
+      <p:sp>
+        <p:nvSpPr>
+          <p:cNvPr id="40" name="Rechteck 39"/>
+          <p:cNvSpPr/>
+          <p:nvPr/>
+        </p:nvSpPr>
+        <p:spPr>
+          <a:xfrm>
+            <a:off x="909951" y="3573016"/>
+            <a:ext cx="637713" cy="571582"/>
+          </a:xfrm>
+          <a:prstGeom prst="rect">
+            <a:avLst/>
+          </a:prstGeom>
+          <a:solidFill>
+            <a:schemeClr val="bg1"/>
+          </a:solidFill>
+          <a:ln>
+            <a:solidFill>
+              <a:schemeClr val="tx1"/>
+            </a:solidFill>
+          </a:ln>
+        </p:spPr>
+        <p:style>
+          <a:lnRef idx="2">
+            <a:schemeClr val="accent1">
+              <a:shade val="50000"/>
+            </a:schemeClr>
+          </a:lnRef>
+          <a:fillRef idx="1">
+            <a:schemeClr val="accent1"/>
+          </a:fillRef>
+          <a:effectRef idx="0">
+            <a:schemeClr val="accent1"/>
+          </a:effectRef>
+          <a:fontRef idx="minor">
+            <a:schemeClr val="lt1"/>
+          </a:fontRef>
+        </p:style>
+        <p:txBody>
+          <a:bodyPr rtlCol="0" anchor="ctr"/>
+          <a:lstStyle/>
+          <a:p>
+            <a:pPr algn="ctr"/>
+            <a:r>
+              <a:rPr lang="el-GR" b="1" dirty="0" smtClean="0">
+                <a:solidFill>
+                  <a:schemeClr val="tx1"/>
+                </a:solidFill>
+              </a:rPr>
+              <a:t>ϕ</a:t>
+            </a:r>
+            <a:r>
+              <a:rPr lang="de-DE" b="1" baseline="30000" dirty="0" smtClean="0">
+                <a:solidFill>
+                  <a:schemeClr val="tx1"/>
+                </a:solidFill>
+              </a:rPr>
+              <a:t>1</a:t>
+            </a:r>
+            <a:r>
+              <a:rPr lang="el-GR" b="1" baseline="-25000" dirty="0" smtClean="0">
+                <a:solidFill>
+                  <a:schemeClr val="tx1"/>
+                </a:solidFill>
+              </a:rPr>
+              <a:t>α</a:t>
+            </a:r>
+            <a:r>
+              <a:rPr lang="de-DE" b="1" baseline="-25000" dirty="0" smtClean="0">
+                <a:solidFill>
+                  <a:schemeClr val="tx1"/>
+                </a:solidFill>
+              </a:rPr>
+              <a:t>1</a:t>
+            </a:r>
+            <a:endParaRPr lang="de-DE" b="1" baseline="-25000" dirty="0">
+              <a:solidFill>
+                <a:schemeClr val="tx1"/>
+              </a:solidFill>
+            </a:endParaRPr>
+          </a:p>
+        </p:txBody>
+      </p:sp>
+      <p:sp>
+        <p:nvSpPr>
+          <p:cNvPr id="41" name="Rechteck 40"/>
+          <p:cNvSpPr/>
+          <p:nvPr/>
+        </p:nvSpPr>
+        <p:spPr>
+          <a:xfrm>
+            <a:off x="899593" y="4365104"/>
+            <a:ext cx="648072" cy="571582"/>
+          </a:xfrm>
+          <a:prstGeom prst="rect">
+            <a:avLst/>
+          </a:prstGeom>
+          <a:solidFill>
+            <a:schemeClr val="bg1"/>
+          </a:solidFill>
+          <a:ln>
+            <a:solidFill>
+              <a:schemeClr val="tx1"/>
+            </a:solidFill>
+          </a:ln>
+        </p:spPr>
+        <p:style>
+          <a:lnRef idx="2">
+            <a:schemeClr val="accent1">
+              <a:shade val="50000"/>
+            </a:schemeClr>
+          </a:lnRef>
+          <a:fillRef idx="1">
+            <a:schemeClr val="accent1"/>
+          </a:fillRef>
+          <a:effectRef idx="0">
+            <a:schemeClr val="accent1"/>
+          </a:effectRef>
+          <a:fontRef idx="minor">
+            <a:schemeClr val="lt1"/>
+          </a:fontRef>
+        </p:style>
+        <p:txBody>
+          <a:bodyPr rtlCol="0" anchor="ctr"/>
+          <a:lstStyle/>
+          <a:p>
+            <a:pPr algn="ctr"/>
+            <a:r>
+              <a:rPr lang="el-GR" b="1" dirty="0" smtClean="0">
+                <a:solidFill>
+                  <a:schemeClr val="tx1"/>
+                </a:solidFill>
+              </a:rPr>
+              <a:t>ϕ</a:t>
+            </a:r>
+            <a:r>
+              <a:rPr lang="de-DE" b="1" baseline="30000" dirty="0" smtClean="0">
+                <a:solidFill>
+                  <a:schemeClr val="tx1"/>
+                </a:solidFill>
+              </a:rPr>
+              <a:t>2</a:t>
+            </a:r>
+            <a:r>
+              <a:rPr lang="el-GR" b="1" baseline="-25000" dirty="0" smtClean="0">
+                <a:solidFill>
+                  <a:schemeClr val="tx1"/>
+                </a:solidFill>
+              </a:rPr>
+              <a:t>α</a:t>
+            </a:r>
+            <a:r>
+              <a:rPr lang="de-DE" b="1" baseline="-25000" dirty="0" smtClean="0">
+                <a:solidFill>
+                  <a:schemeClr val="tx1"/>
+                </a:solidFill>
+              </a:rPr>
+              <a:t>2</a:t>
+            </a:r>
+            <a:endParaRPr lang="de-DE" b="1" baseline="-25000" dirty="0">
+              <a:solidFill>
+                <a:schemeClr val="tx1"/>
+              </a:solidFill>
+            </a:endParaRPr>
+          </a:p>
+        </p:txBody>
+      </p:sp>
+      <p:sp>
+        <p:nvSpPr>
+          <p:cNvPr id="42" name="Rechteck 41"/>
+          <p:cNvSpPr/>
+          <p:nvPr/>
+        </p:nvSpPr>
+        <p:spPr>
+          <a:xfrm>
+            <a:off x="1763688" y="3573016"/>
+            <a:ext cx="936104" cy="1368152"/>
+          </a:xfrm>
+          <a:prstGeom prst="rect">
+            <a:avLst/>
+          </a:prstGeom>
+          <a:solidFill>
+            <a:schemeClr val="bg1"/>
+          </a:solidFill>
+          <a:ln>
+            <a:solidFill>
+              <a:schemeClr val="tx1"/>
+            </a:solidFill>
+          </a:ln>
+        </p:spPr>
+        <p:style>
+          <a:lnRef idx="2">
+            <a:schemeClr val="accent1">
+              <a:shade val="50000"/>
+            </a:schemeClr>
+          </a:lnRef>
+          <a:fillRef idx="1">
+            <a:schemeClr val="accent1"/>
+          </a:fillRef>
+          <a:effectRef idx="0">
+            <a:schemeClr val="accent1"/>
+          </a:effectRef>
+          <a:fontRef idx="minor">
+            <a:schemeClr val="lt1"/>
+          </a:fontRef>
+        </p:style>
+        <p:txBody>
+          <a:bodyPr vert="vert270" rtlCol="0" anchor="ctr"/>
+          <a:lstStyle/>
+          <a:p>
+            <a:pPr algn="ctr"/>
+            <a:r>
+              <a:rPr lang="de-DE" b="1" dirty="0" err="1" smtClean="0">
+                <a:solidFill>
+                  <a:schemeClr val="tx1"/>
+                </a:solidFill>
+              </a:rPr>
+              <a:t>iSWAP</a:t>
+            </a:r>
+            <a:r>
+              <a:rPr lang="de-DE" b="1" dirty="0" smtClean="0">
+                <a:solidFill>
+                  <a:schemeClr val="tx1"/>
+                </a:solidFill>
+              </a:rPr>
+              <a:t>(</a:t>
+            </a:r>
+            <a:r>
+              <a:rPr lang="el-GR" b="1" dirty="0" smtClean="0">
+                <a:solidFill>
+                  <a:schemeClr val="tx1"/>
+                </a:solidFill>
+              </a:rPr>
+              <a:t>ε</a:t>
+            </a:r>
+            <a:r>
+              <a:rPr lang="de-DE" b="1" baseline="-25000" dirty="0" smtClean="0">
+                <a:solidFill>
+                  <a:schemeClr val="tx1"/>
+                </a:solidFill>
+              </a:rPr>
+              <a:t>1</a:t>
+            </a:r>
+            <a:r>
+              <a:rPr lang="de-DE" b="1" dirty="0" smtClean="0">
+                <a:solidFill>
+                  <a:schemeClr val="tx1"/>
+                </a:solidFill>
+              </a:rPr>
+              <a:t>,</a:t>
+            </a:r>
+            <a:r>
+              <a:rPr lang="el-GR" b="1" dirty="0" smtClean="0">
+                <a:solidFill>
+                  <a:schemeClr val="tx1"/>
+                </a:solidFill>
+              </a:rPr>
+              <a:t>δ</a:t>
+            </a:r>
+            <a:r>
+              <a:rPr lang="de-DE" b="1" baseline="-25000" dirty="0" smtClean="0">
+                <a:solidFill>
+                  <a:schemeClr val="tx1"/>
+                </a:solidFill>
+              </a:rPr>
+              <a:t>1</a:t>
+            </a:r>
+            <a:r>
+              <a:rPr lang="de-DE" b="1" dirty="0" smtClean="0">
+                <a:solidFill>
+                  <a:schemeClr val="tx1"/>
+                </a:solidFill>
+              </a:rPr>
+              <a:t>)</a:t>
+            </a:r>
+            <a:endParaRPr lang="de-DE" b="1" dirty="0">
+              <a:solidFill>
+                <a:schemeClr val="tx1"/>
+              </a:solidFill>
+            </a:endParaRPr>
+          </a:p>
+        </p:txBody>
+      </p:sp>
+      <p:sp>
+        <p:nvSpPr>
+          <p:cNvPr id="43" name="Rechteck 42"/>
+          <p:cNvSpPr/>
+          <p:nvPr/>
+        </p:nvSpPr>
+        <p:spPr>
+          <a:xfrm>
+            <a:off x="2915816" y="3573016"/>
+            <a:ext cx="648072" cy="571582"/>
+          </a:xfrm>
+          <a:prstGeom prst="rect">
+            <a:avLst/>
+          </a:prstGeom>
+          <a:solidFill>
+            <a:schemeClr val="bg1"/>
+          </a:solidFill>
+          <a:ln>
+            <a:solidFill>
+              <a:schemeClr val="tx1"/>
+            </a:solidFill>
+          </a:ln>
+        </p:spPr>
+        <p:style>
+          <a:lnRef idx="2">
+            <a:schemeClr val="accent1">
+              <a:shade val="50000"/>
+            </a:schemeClr>
+          </a:lnRef>
+          <a:fillRef idx="1">
+            <a:schemeClr val="accent1"/>
+          </a:fillRef>
+          <a:effectRef idx="0">
+            <a:schemeClr val="accent1"/>
+          </a:effectRef>
+          <a:fontRef idx="minor">
+            <a:schemeClr val="lt1"/>
+          </a:fontRef>
+        </p:style>
+        <p:txBody>
+          <a:bodyPr rtlCol="0" anchor="ctr"/>
+          <a:lstStyle/>
+          <a:p>
+            <a:pPr algn="ctr"/>
+            <a:r>
+              <a:rPr lang="de-DE" b="1" dirty="0" smtClean="0">
+                <a:solidFill>
+                  <a:schemeClr val="tx1"/>
+                </a:solidFill>
+              </a:rPr>
+              <a:t>Z</a:t>
+            </a:r>
+            <a:r>
+              <a:rPr lang="el-GR" b="1" baseline="-25000" dirty="0" smtClean="0">
+                <a:solidFill>
+                  <a:schemeClr val="tx1"/>
+                </a:solidFill>
+              </a:rPr>
+              <a:t>β</a:t>
+            </a:r>
+            <a:r>
+              <a:rPr lang="de-DE" b="1" baseline="-25000" dirty="0" smtClean="0">
+                <a:solidFill>
+                  <a:schemeClr val="tx1"/>
+                </a:solidFill>
+              </a:rPr>
+              <a:t>1</a:t>
+            </a:r>
+            <a:endParaRPr lang="de-DE" b="1" baseline="-25000" dirty="0">
+              <a:solidFill>
+                <a:schemeClr val="tx1"/>
+              </a:solidFill>
+            </a:endParaRPr>
+          </a:p>
+        </p:txBody>
+      </p:sp>
+      <p:sp>
+        <p:nvSpPr>
+          <p:cNvPr id="44" name="Rechteck 43"/>
+          <p:cNvSpPr/>
+          <p:nvPr/>
+        </p:nvSpPr>
+        <p:spPr>
+          <a:xfrm>
+            <a:off x="2915816" y="4365104"/>
+            <a:ext cx="648072" cy="571582"/>
+          </a:xfrm>
+          <a:prstGeom prst="rect">
+            <a:avLst/>
+          </a:prstGeom>
+          <a:solidFill>
+            <a:schemeClr val="bg1"/>
+          </a:solidFill>
+          <a:ln>
+            <a:solidFill>
+              <a:schemeClr val="tx1"/>
+            </a:solidFill>
+          </a:ln>
+        </p:spPr>
+        <p:style>
+          <a:lnRef idx="2">
+            <a:schemeClr val="accent1">
+              <a:shade val="50000"/>
+            </a:schemeClr>
+          </a:lnRef>
+          <a:fillRef idx="1">
+            <a:schemeClr val="accent1"/>
+          </a:fillRef>
+          <a:effectRef idx="0">
+            <a:schemeClr val="accent1"/>
+          </a:effectRef>
+          <a:fontRef idx="minor">
+            <a:schemeClr val="lt1"/>
+          </a:fontRef>
+        </p:style>
+        <p:txBody>
+          <a:bodyPr rtlCol="0" anchor="ctr"/>
+          <a:lstStyle/>
+          <a:p>
+            <a:pPr algn="ctr"/>
+            <a:r>
+              <a:rPr lang="de-DE" b="1" dirty="0" smtClean="0">
+                <a:solidFill>
+                  <a:schemeClr val="tx1"/>
+                </a:solidFill>
+              </a:rPr>
+              <a:t>Z</a:t>
+            </a:r>
+            <a:r>
+              <a:rPr lang="el-GR" b="1" baseline="-25000" dirty="0" smtClean="0">
+                <a:solidFill>
+                  <a:schemeClr val="tx1"/>
+                </a:solidFill>
+              </a:rPr>
+              <a:t>β</a:t>
+            </a:r>
+            <a:r>
+              <a:rPr lang="de-DE" b="1" baseline="-25000" dirty="0" smtClean="0">
+                <a:solidFill>
+                  <a:schemeClr val="tx1"/>
+                </a:solidFill>
+              </a:rPr>
+              <a:t>2</a:t>
+            </a:r>
+            <a:endParaRPr lang="de-DE" b="1" baseline="-25000" dirty="0">
+              <a:solidFill>
+                <a:schemeClr val="tx1"/>
+              </a:solidFill>
+            </a:endParaRPr>
+          </a:p>
+        </p:txBody>
+      </p:sp>
+      <p:sp>
+        <p:nvSpPr>
+          <p:cNvPr id="45" name="Rechteck 44"/>
+          <p:cNvSpPr/>
+          <p:nvPr/>
+        </p:nvSpPr>
+        <p:spPr>
+          <a:xfrm>
+            <a:off x="3995936" y="3573016"/>
+            <a:ext cx="936104" cy="1368152"/>
+          </a:xfrm>
+          <a:prstGeom prst="rect">
+            <a:avLst/>
+          </a:prstGeom>
+          <a:solidFill>
+            <a:schemeClr val="bg1"/>
+          </a:solidFill>
+          <a:ln>
+            <a:solidFill>
+              <a:schemeClr val="tx1"/>
+            </a:solidFill>
+          </a:ln>
+        </p:spPr>
+        <p:style>
+          <a:lnRef idx="2">
+            <a:schemeClr val="accent1">
+              <a:shade val="50000"/>
+            </a:schemeClr>
+          </a:lnRef>
+          <a:fillRef idx="1">
+            <a:schemeClr val="accent1"/>
+          </a:fillRef>
+          <a:effectRef idx="0">
+            <a:schemeClr val="accent1"/>
+          </a:effectRef>
+          <a:fontRef idx="minor">
+            <a:schemeClr val="lt1"/>
+          </a:fontRef>
+        </p:style>
+        <p:txBody>
+          <a:bodyPr vert="vert270" rtlCol="0" anchor="ctr"/>
+          <a:lstStyle/>
+          <a:p>
+            <a:pPr algn="ctr"/>
+            <a:r>
+              <a:rPr lang="de-DE" b="1" dirty="0" err="1" smtClean="0">
+                <a:solidFill>
+                  <a:schemeClr val="tx1"/>
+                </a:solidFill>
+              </a:rPr>
+              <a:t>iSWAP</a:t>
+            </a:r>
+            <a:r>
+              <a:rPr lang="de-DE" b="1" dirty="0" smtClean="0">
+                <a:solidFill>
+                  <a:schemeClr val="tx1"/>
+                </a:solidFill>
+              </a:rPr>
+              <a:t>(</a:t>
+            </a:r>
+            <a:r>
+              <a:rPr lang="el-GR" b="1" dirty="0" smtClean="0">
+                <a:solidFill>
+                  <a:schemeClr val="tx1"/>
+                </a:solidFill>
+              </a:rPr>
+              <a:t>ε</a:t>
+            </a:r>
+            <a:r>
+              <a:rPr lang="de-DE" b="1" baseline="-25000" dirty="0" smtClean="0">
+                <a:solidFill>
+                  <a:schemeClr val="tx1"/>
+                </a:solidFill>
+              </a:rPr>
+              <a:t>2</a:t>
+            </a:r>
+            <a:r>
+              <a:rPr lang="de-DE" b="1" dirty="0" smtClean="0">
+                <a:solidFill>
+                  <a:schemeClr val="tx1"/>
+                </a:solidFill>
+              </a:rPr>
+              <a:t>,</a:t>
+            </a:r>
+            <a:r>
+              <a:rPr lang="el-GR" b="1" dirty="0" smtClean="0">
+                <a:solidFill>
+                  <a:schemeClr val="tx1"/>
+                </a:solidFill>
+              </a:rPr>
+              <a:t>δ</a:t>
+            </a:r>
+            <a:r>
+              <a:rPr lang="de-DE" b="1" baseline="-25000" dirty="0" smtClean="0">
+                <a:solidFill>
+                  <a:schemeClr val="tx1"/>
+                </a:solidFill>
+              </a:rPr>
+              <a:t>2</a:t>
+            </a:r>
+            <a:r>
+              <a:rPr lang="de-DE" b="1" dirty="0" smtClean="0">
+                <a:solidFill>
+                  <a:schemeClr val="tx1"/>
+                </a:solidFill>
+              </a:rPr>
+              <a:t>)</a:t>
+            </a:r>
+            <a:endParaRPr lang="de-DE" b="1" dirty="0">
+              <a:solidFill>
+                <a:schemeClr val="tx1"/>
+              </a:solidFill>
+            </a:endParaRPr>
+          </a:p>
+        </p:txBody>
+      </p:sp>
+      <p:sp>
+        <p:nvSpPr>
+          <p:cNvPr id="46" name="Rechteck 45"/>
+          <p:cNvSpPr/>
+          <p:nvPr/>
+        </p:nvSpPr>
+        <p:spPr>
+          <a:xfrm>
+            <a:off x="5076056" y="3573016"/>
+            <a:ext cx="648072" cy="571582"/>
+          </a:xfrm>
+          <a:prstGeom prst="rect">
+            <a:avLst/>
+          </a:prstGeom>
+          <a:solidFill>
+            <a:schemeClr val="bg1"/>
+          </a:solidFill>
+          <a:ln>
+            <a:solidFill>
+              <a:schemeClr val="tx1"/>
+            </a:solidFill>
+          </a:ln>
+        </p:spPr>
+        <p:style>
+          <a:lnRef idx="2">
+            <a:schemeClr val="accent1">
+              <a:shade val="50000"/>
+            </a:schemeClr>
+          </a:lnRef>
+          <a:fillRef idx="1">
+            <a:schemeClr val="accent1"/>
+          </a:fillRef>
+          <a:effectRef idx="0">
+            <a:schemeClr val="accent1"/>
+          </a:effectRef>
+          <a:fontRef idx="minor">
+            <a:schemeClr val="lt1"/>
+          </a:fontRef>
+        </p:style>
+        <p:txBody>
+          <a:bodyPr rtlCol="0" anchor="ctr"/>
+          <a:lstStyle/>
+          <a:p>
+            <a:pPr algn="ctr"/>
+            <a:r>
+              <a:rPr lang="el-GR" b="1" dirty="0" smtClean="0">
+                <a:solidFill>
+                  <a:schemeClr val="tx1"/>
+                </a:solidFill>
+              </a:rPr>
+              <a:t>φ</a:t>
+            </a:r>
+            <a:r>
+              <a:rPr lang="de-DE" b="1" baseline="30000" dirty="0" smtClean="0">
+                <a:solidFill>
+                  <a:schemeClr val="tx1"/>
+                </a:solidFill>
+              </a:rPr>
+              <a:t>1</a:t>
+            </a:r>
+            <a:r>
+              <a:rPr lang="el-GR" b="1" baseline="-25000" dirty="0" smtClean="0">
+                <a:solidFill>
+                  <a:schemeClr val="tx1"/>
+                </a:solidFill>
+              </a:rPr>
+              <a:t>γ</a:t>
+            </a:r>
+            <a:r>
+              <a:rPr lang="de-DE" b="1" baseline="-25000" dirty="0" smtClean="0">
+                <a:solidFill>
+                  <a:schemeClr val="tx1"/>
+                </a:solidFill>
+              </a:rPr>
+              <a:t>1</a:t>
+            </a:r>
+            <a:endParaRPr lang="de-DE" b="1" dirty="0">
+              <a:solidFill>
+                <a:schemeClr val="tx1"/>
+              </a:solidFill>
+            </a:endParaRPr>
+          </a:p>
+        </p:txBody>
+      </p:sp>
+      <p:sp>
+        <p:nvSpPr>
+          <p:cNvPr id="47" name="Rechteck 46"/>
+          <p:cNvSpPr/>
+          <p:nvPr/>
+        </p:nvSpPr>
+        <p:spPr>
+          <a:xfrm>
+            <a:off x="5076056" y="4365104"/>
+            <a:ext cx="648072" cy="571582"/>
+          </a:xfrm>
+          <a:prstGeom prst="rect">
+            <a:avLst/>
+          </a:prstGeom>
+          <a:solidFill>
+            <a:schemeClr val="bg1"/>
+          </a:solidFill>
+          <a:ln>
+            <a:solidFill>
+              <a:schemeClr val="tx1"/>
+            </a:solidFill>
+          </a:ln>
+        </p:spPr>
+        <p:style>
+          <a:lnRef idx="2">
+            <a:schemeClr val="accent1">
+              <a:shade val="50000"/>
+            </a:schemeClr>
+          </a:lnRef>
+          <a:fillRef idx="1">
+            <a:schemeClr val="accent1"/>
+          </a:fillRef>
+          <a:effectRef idx="0">
+            <a:schemeClr val="accent1"/>
+          </a:effectRef>
+          <a:fontRef idx="minor">
+            <a:schemeClr val="lt1"/>
+          </a:fontRef>
+        </p:style>
+        <p:txBody>
+          <a:bodyPr rtlCol="0" anchor="ctr"/>
+          <a:lstStyle/>
+          <a:p>
+            <a:pPr algn="ctr"/>
+            <a:r>
+              <a:rPr lang="el-GR" b="1" dirty="0" smtClean="0">
+                <a:solidFill>
+                  <a:schemeClr val="tx1"/>
+                </a:solidFill>
+              </a:rPr>
+              <a:t>φ</a:t>
+            </a:r>
+            <a:r>
+              <a:rPr lang="de-DE" b="1" baseline="30000" dirty="0" smtClean="0">
+                <a:solidFill>
+                  <a:schemeClr val="tx1"/>
+                </a:solidFill>
+              </a:rPr>
+              <a:t>2</a:t>
+            </a:r>
+            <a:r>
+              <a:rPr lang="el-GR" b="1" baseline="-25000" dirty="0" smtClean="0">
+                <a:solidFill>
+                  <a:schemeClr val="tx1"/>
+                </a:solidFill>
+              </a:rPr>
+              <a:t>γ</a:t>
+            </a:r>
+            <a:r>
+              <a:rPr lang="de-DE" b="1" baseline="-25000" dirty="0" smtClean="0">
+                <a:solidFill>
+                  <a:schemeClr val="tx1"/>
+                </a:solidFill>
+              </a:rPr>
+              <a:t>2</a:t>
+            </a:r>
+            <a:endParaRPr lang="de-DE" b="1" baseline="-25000" dirty="0">
+              <a:solidFill>
+                <a:schemeClr val="tx1"/>
+              </a:solidFill>
+            </a:endParaRPr>
+          </a:p>
+        </p:txBody>
+      </p:sp>
+      <p:grpSp>
+        <p:nvGrpSpPr>
+          <p:cNvPr id="2" name="Groupe 42"/>
+          <p:cNvGrpSpPr/>
+          <p:nvPr/>
+        </p:nvGrpSpPr>
+        <p:grpSpPr>
+          <a:xfrm>
+            <a:off x="6156176" y="3573016"/>
+            <a:ext cx="618594" cy="613563"/>
+            <a:chOff x="5918764" y="1159253"/>
+            <a:chExt cx="618594" cy="613563"/>
+          </a:xfrm>
+        </p:grpSpPr>
+        <p:sp>
+          <p:nvSpPr>
+            <p:cNvPr id="49" name="Rectangle à coins arrondis 43"/>
+            <p:cNvSpPr/>
+            <p:nvPr/>
+          </p:nvSpPr>
+          <p:spPr>
+            <a:xfrm>
+              <a:off x="5940152" y="1159253"/>
+              <a:ext cx="576064" cy="613563"/>
+            </a:xfrm>
+            <a:prstGeom prst="roundRect">
+              <a:avLst/>
+            </a:prstGeom>
+            <a:solidFill>
+              <a:schemeClr val="bg1"/>
+            </a:solidFill>
+            <a:ln>
+              <a:solidFill>
+                <a:schemeClr val="tx1"/>
+              </a:solidFill>
+            </a:ln>
+          </p:spPr>
+          <p:style>
+            <a:lnRef idx="2">
+              <a:schemeClr val="accent1">
+                <a:shade val="50000"/>
+              </a:schemeClr>
+            </a:lnRef>
+            <a:fillRef idx="1">
+              <a:schemeClr val="accent1"/>
+            </a:fillRef>
+            <a:effectRef idx="0">
+              <a:schemeClr val="accent1"/>
+            </a:effectRef>
+            <a:fontRef idx="minor">
+              <a:schemeClr val="lt1"/>
+            </a:fontRef>
+          </p:style>
+          <p:txBody>
+            <a:bodyPr rtlCol="0" anchor="ctr"/>
+            <a:lstStyle/>
+            <a:p>
+              <a:pPr algn="ctr"/>
+              <a:endParaRPr lang="fr-FR">
+                <a:latin typeface="Arial" pitchFamily="34" charset="0"/>
+                <a:cs typeface="Arial" pitchFamily="34" charset="0"/>
+              </a:endParaRPr>
+            </a:p>
+          </p:txBody>
+        </p:sp>
+        <p:cxnSp>
+          <p:nvCxnSpPr>
+            <p:cNvPr id="50" name="Connecteur droit avec flèche 44"/>
+            <p:cNvCxnSpPr/>
+            <p:nvPr/>
+          </p:nvCxnSpPr>
+          <p:spPr>
+            <a:xfrm rot="10800000">
+              <a:off x="6040721" y="1461357"/>
+              <a:ext cx="189802" cy="184040"/>
+            </a:xfrm>
+            <a:prstGeom prst="straightConnector1">
+              <a:avLst/>
+            </a:prstGeom>
+            <a:ln w="28575">
+              <a:solidFill>
+                <a:schemeClr val="bg1">
+                  <a:lumMod val="65000"/>
+                </a:schemeClr>
+              </a:solidFill>
+              <a:headEnd type="oval" w="med" len="med"/>
+              <a:tailEnd type="triangle" w="med" len="med"/>
+            </a:ln>
+          </p:spPr>
+          <p:style>
+            <a:lnRef idx="1">
+              <a:schemeClr val="accent1"/>
+            </a:lnRef>
+            <a:fillRef idx="0">
+              <a:schemeClr val="accent1"/>
+            </a:fillRef>
+            <a:effectRef idx="0">
+              <a:schemeClr val="accent1"/>
+            </a:effectRef>
+            <a:fontRef idx="minor">
+              <a:schemeClr val="tx1"/>
+            </a:fontRef>
+          </p:style>
+        </p:cxnSp>
+        <p:cxnSp>
+          <p:nvCxnSpPr>
+            <p:cNvPr id="51" name="Connecteur droit avec flèche 45"/>
+            <p:cNvCxnSpPr/>
+            <p:nvPr/>
+          </p:nvCxnSpPr>
+          <p:spPr>
+            <a:xfrm flipV="1">
+              <a:off x="6231117" y="1464162"/>
+              <a:ext cx="191071" cy="190677"/>
+            </a:xfrm>
+            <a:prstGeom prst="straightConnector1">
+              <a:avLst/>
+            </a:prstGeom>
+            <a:ln w="28575">
+              <a:solidFill>
+                <a:schemeClr val="tx1">
+                  <a:lumMod val="65000"/>
+                  <a:lumOff val="35000"/>
+                </a:schemeClr>
+              </a:solidFill>
+              <a:headEnd type="oval" w="med" len="med"/>
+              <a:tailEnd type="triangle" w="med" len="med"/>
+            </a:ln>
+          </p:spPr>
+          <p:style>
+            <a:lnRef idx="1">
+              <a:schemeClr val="accent1"/>
+            </a:lnRef>
+            <a:fillRef idx="0">
+              <a:schemeClr val="accent1"/>
+            </a:fillRef>
+            <a:effectRef idx="0">
+              <a:schemeClr val="accent1"/>
+            </a:effectRef>
+            <a:fontRef idx="minor">
+              <a:schemeClr val="tx1"/>
+            </a:fontRef>
+          </p:style>
+        </p:cxnSp>
+        <p:sp>
+          <p:nvSpPr>
+            <p:cNvPr id="52" name="Rectangle 46"/>
+            <p:cNvSpPr/>
+            <p:nvPr/>
+          </p:nvSpPr>
+          <p:spPr>
+            <a:xfrm>
+              <a:off x="5918764" y="1164670"/>
+              <a:ext cx="298480" cy="338554"/>
+            </a:xfrm>
+            <a:prstGeom prst="rect">
+              <a:avLst/>
+            </a:prstGeom>
+          </p:spPr>
+          <p:txBody>
+            <a:bodyPr wrap="none">
+              <a:spAutoFit/>
+            </a:bodyPr>
+            <a:lstStyle/>
+            <a:p>
+              <a:r>
+                <a:rPr lang="fr-FR" sz="1600" dirty="0" smtClean="0">
+                  <a:latin typeface="Arial" pitchFamily="34" charset="0"/>
+                  <a:cs typeface="Arial" pitchFamily="34" charset="0"/>
+                </a:rPr>
+                <a:t>0</a:t>
+              </a:r>
+              <a:endParaRPr lang="fr-FR" sz="1600" dirty="0">
+                <a:latin typeface="Arial" pitchFamily="34" charset="0"/>
+                <a:cs typeface="Arial" pitchFamily="34" charset="0"/>
+              </a:endParaRPr>
+            </a:p>
+          </p:txBody>
+        </p:sp>
+        <p:sp>
+          <p:nvSpPr>
+            <p:cNvPr id="53" name="Rectangle 47"/>
+            <p:cNvSpPr/>
+            <p:nvPr/>
+          </p:nvSpPr>
+          <p:spPr>
+            <a:xfrm>
+              <a:off x="6238878" y="1159323"/>
+              <a:ext cx="298480" cy="338554"/>
+            </a:xfrm>
+            <a:prstGeom prst="rect">
+              <a:avLst/>
+            </a:prstGeom>
+          </p:spPr>
+          <p:txBody>
+            <a:bodyPr wrap="none">
+              <a:spAutoFit/>
+            </a:bodyPr>
+            <a:lstStyle/>
+            <a:p>
+              <a:r>
+                <a:rPr lang="fr-FR" sz="1600" dirty="0" smtClean="0">
+                  <a:latin typeface="Arial" pitchFamily="34" charset="0"/>
+                  <a:cs typeface="Arial" pitchFamily="34" charset="0"/>
+                </a:rPr>
+                <a:t>1</a:t>
+              </a:r>
+              <a:endParaRPr lang="fr-FR" sz="1600" dirty="0">
+                <a:latin typeface="Arial" pitchFamily="34" charset="0"/>
+                <a:cs typeface="Arial" pitchFamily="34" charset="0"/>
+              </a:endParaRPr>
+            </a:p>
+          </p:txBody>
+        </p:sp>
+      </p:grpSp>
+      <p:grpSp>
+        <p:nvGrpSpPr>
+          <p:cNvPr id="3" name="Groupe 69"/>
+          <p:cNvGrpSpPr/>
+          <p:nvPr/>
+        </p:nvGrpSpPr>
+        <p:grpSpPr>
+          <a:xfrm>
+            <a:off x="6156176" y="4327605"/>
+            <a:ext cx="618594" cy="613563"/>
+            <a:chOff x="5918764" y="1159253"/>
+            <a:chExt cx="618594" cy="613563"/>
+          </a:xfrm>
+        </p:grpSpPr>
+        <p:sp>
+          <p:nvSpPr>
+            <p:cNvPr id="55" name="Rectangle à coins arrondis 70"/>
+            <p:cNvSpPr/>
+            <p:nvPr/>
+          </p:nvSpPr>
+          <p:spPr>
+            <a:xfrm>
+              <a:off x="5940152" y="1159253"/>
+              <a:ext cx="576064" cy="613563"/>
+            </a:xfrm>
+            <a:prstGeom prst="roundRect">
+              <a:avLst/>
+            </a:prstGeom>
+            <a:solidFill>
+              <a:schemeClr val="bg1"/>
+            </a:solidFill>
+            <a:ln>
+              <a:solidFill>
+                <a:schemeClr val="tx1"/>
+              </a:solidFill>
+            </a:ln>
+          </p:spPr>
+          <p:style>
+            <a:lnRef idx="2">
+              <a:schemeClr val="accent1">
+                <a:shade val="50000"/>
+              </a:schemeClr>
+            </a:lnRef>
+            <a:fillRef idx="1">
+              <a:schemeClr val="accent1"/>
+            </a:fillRef>
+            <a:effectRef idx="0">
+              <a:schemeClr val="accent1"/>
+            </a:effectRef>
+            <a:fontRef idx="minor">
+              <a:schemeClr val="lt1"/>
+            </a:fontRef>
+          </p:style>
+          <p:txBody>
+            <a:bodyPr rtlCol="0" anchor="ctr"/>
+            <a:lstStyle/>
+            <a:p>
+              <a:pPr algn="ctr"/>
+              <a:endParaRPr lang="fr-FR">
+                <a:latin typeface="Arial" pitchFamily="34" charset="0"/>
+                <a:cs typeface="Arial" pitchFamily="34" charset="0"/>
+              </a:endParaRPr>
+            </a:p>
+          </p:txBody>
+        </p:sp>
+        <p:cxnSp>
+          <p:nvCxnSpPr>
+            <p:cNvPr id="56" name="Connecteur droit avec flèche 71"/>
+            <p:cNvCxnSpPr/>
+            <p:nvPr/>
+          </p:nvCxnSpPr>
+          <p:spPr>
+            <a:xfrm rot="10800000">
+              <a:off x="6040721" y="1461357"/>
+              <a:ext cx="189802" cy="184040"/>
+            </a:xfrm>
+            <a:prstGeom prst="straightConnector1">
+              <a:avLst/>
+            </a:prstGeom>
+            <a:ln w="28575">
+              <a:solidFill>
+                <a:schemeClr val="bg1">
+                  <a:lumMod val="65000"/>
+                </a:schemeClr>
+              </a:solidFill>
+              <a:headEnd type="oval" w="med" len="med"/>
+              <a:tailEnd type="triangle" w="med" len="med"/>
+            </a:ln>
+          </p:spPr>
+          <p:style>
+            <a:lnRef idx="1">
+              <a:schemeClr val="accent1"/>
+            </a:lnRef>
+            <a:fillRef idx="0">
+              <a:schemeClr val="accent1"/>
+            </a:fillRef>
+            <a:effectRef idx="0">
+              <a:schemeClr val="accent1"/>
+            </a:effectRef>
+            <a:fontRef idx="minor">
+              <a:schemeClr val="tx1"/>
+            </a:fontRef>
+          </p:style>
+        </p:cxnSp>
+        <p:cxnSp>
+          <p:nvCxnSpPr>
+            <p:cNvPr id="57" name="Connecteur droit avec flèche 72"/>
+            <p:cNvCxnSpPr/>
+            <p:nvPr/>
+          </p:nvCxnSpPr>
+          <p:spPr>
+            <a:xfrm flipV="1">
+              <a:off x="6231117" y="1464162"/>
+              <a:ext cx="191071" cy="190677"/>
+            </a:xfrm>
+            <a:prstGeom prst="straightConnector1">
+              <a:avLst/>
+            </a:prstGeom>
+            <a:ln w="28575">
+              <a:solidFill>
+                <a:schemeClr val="tx1">
+                  <a:lumMod val="65000"/>
+                  <a:lumOff val="35000"/>
+                </a:schemeClr>
+              </a:solidFill>
+              <a:headEnd type="oval" w="med" len="med"/>
+              <a:tailEnd type="triangle" w="med" len="med"/>
+            </a:ln>
+          </p:spPr>
+          <p:style>
+            <a:lnRef idx="1">
+              <a:schemeClr val="accent1"/>
+            </a:lnRef>
+            <a:fillRef idx="0">
+              <a:schemeClr val="accent1"/>
+            </a:fillRef>
+            <a:effectRef idx="0">
+              <a:schemeClr val="accent1"/>
+            </a:effectRef>
+            <a:fontRef idx="minor">
+              <a:schemeClr val="tx1"/>
+            </a:fontRef>
+          </p:style>
+        </p:cxnSp>
+        <p:sp>
+          <p:nvSpPr>
+            <p:cNvPr id="58" name="Rectangle 73"/>
+            <p:cNvSpPr/>
+            <p:nvPr/>
+          </p:nvSpPr>
+          <p:spPr>
+            <a:xfrm>
+              <a:off x="5918764" y="1164670"/>
+              <a:ext cx="298480" cy="338554"/>
+            </a:xfrm>
+            <a:prstGeom prst="rect">
+              <a:avLst/>
+            </a:prstGeom>
+          </p:spPr>
+          <p:txBody>
+            <a:bodyPr wrap="none">
+              <a:spAutoFit/>
+            </a:bodyPr>
+            <a:lstStyle/>
+            <a:p>
+              <a:r>
+                <a:rPr lang="fr-FR" sz="1600" dirty="0" smtClean="0">
+                  <a:latin typeface="Arial" pitchFamily="34" charset="0"/>
+                  <a:cs typeface="Arial" pitchFamily="34" charset="0"/>
+                </a:rPr>
+                <a:t>0</a:t>
+              </a:r>
+              <a:endParaRPr lang="fr-FR" sz="1600" dirty="0">
+                <a:latin typeface="Arial" pitchFamily="34" charset="0"/>
+                <a:cs typeface="Arial" pitchFamily="34" charset="0"/>
+              </a:endParaRPr>
+            </a:p>
+          </p:txBody>
+        </p:sp>
+        <p:sp>
+          <p:nvSpPr>
+            <p:cNvPr id="59" name="Rectangle 74"/>
+            <p:cNvSpPr/>
+            <p:nvPr/>
+          </p:nvSpPr>
+          <p:spPr>
+            <a:xfrm>
+              <a:off x="6238878" y="1159323"/>
+              <a:ext cx="298480" cy="338554"/>
+            </a:xfrm>
+            <a:prstGeom prst="rect">
+              <a:avLst/>
+            </a:prstGeom>
+          </p:spPr>
+          <p:txBody>
+            <a:bodyPr wrap="none">
+              <a:spAutoFit/>
+            </a:bodyPr>
+            <a:lstStyle/>
+            <a:p>
+              <a:r>
+                <a:rPr lang="fr-FR" sz="1600" dirty="0" smtClean="0">
+                  <a:latin typeface="Arial" pitchFamily="34" charset="0"/>
+                  <a:cs typeface="Arial" pitchFamily="34" charset="0"/>
+                </a:rPr>
+                <a:t>1</a:t>
+              </a:r>
+              <a:endParaRPr lang="fr-FR" sz="1600" dirty="0">
+                <a:latin typeface="Arial" pitchFamily="34" charset="0"/>
+                <a:cs typeface="Arial" pitchFamily="34" charset="0"/>
+              </a:endParaRPr>
+            </a:p>
+          </p:txBody>
+        </p:sp>
+      </p:grpSp>
+      <p:sp>
+        <p:nvSpPr>
+          <p:cNvPr id="60" name="Textfeld 59"/>
+          <p:cNvSpPr txBox="1"/>
+          <p:nvPr/>
+        </p:nvSpPr>
+        <p:spPr>
+          <a:xfrm>
+            <a:off x="107504" y="2924944"/>
+            <a:ext cx="1635961" cy="338554"/>
+          </a:xfrm>
+          <a:prstGeom prst="rect">
+            <a:avLst/>
+          </a:prstGeom>
+          <a:noFill/>
+        </p:spPr>
+        <p:txBody>
+          <a:bodyPr wrap="none" rtlCol="0">
+            <a:spAutoFit/>
+          </a:bodyPr>
+          <a:lstStyle/>
+          <a:p>
+            <a:r>
+              <a:rPr lang="de-DE" sz="1600" dirty="0" smtClean="0"/>
+              <a:t>State </a:t>
+            </a:r>
+            <a:r>
+              <a:rPr lang="de-DE" sz="1600" dirty="0" err="1" smtClean="0"/>
+              <a:t>Preparation</a:t>
+            </a:r>
+            <a:endParaRPr lang="de-DE" sz="1600" dirty="0"/>
+          </a:p>
+        </p:txBody>
+      </p:sp>
+      <p:sp>
+        <p:nvSpPr>
+          <p:cNvPr id="61" name="Textfeld 60"/>
+          <p:cNvSpPr txBox="1"/>
+          <p:nvPr/>
+        </p:nvSpPr>
+        <p:spPr>
+          <a:xfrm>
+            <a:off x="1979712" y="2924944"/>
+            <a:ext cx="1496500" cy="338554"/>
+          </a:xfrm>
+          <a:prstGeom prst="rect">
+            <a:avLst/>
+          </a:prstGeom>
+          <a:noFill/>
+        </p:spPr>
+        <p:txBody>
+          <a:bodyPr wrap="none" rtlCol="0">
+            <a:spAutoFit/>
+          </a:bodyPr>
+          <a:lstStyle/>
+          <a:p>
+            <a:r>
+              <a:rPr lang="de-DE" sz="1600" dirty="0" smtClean="0"/>
+              <a:t>Oracle </a:t>
+            </a:r>
+            <a:r>
+              <a:rPr lang="de-DE" sz="1600" dirty="0" err="1" smtClean="0"/>
+              <a:t>Function</a:t>
+            </a:r>
+            <a:endParaRPr lang="de-DE" sz="1600" dirty="0"/>
+          </a:p>
+        </p:txBody>
+      </p:sp>
+      <p:sp>
+        <p:nvSpPr>
+          <p:cNvPr id="62" name="Textfeld 61"/>
+          <p:cNvSpPr txBox="1"/>
+          <p:nvPr/>
+        </p:nvSpPr>
+        <p:spPr>
+          <a:xfrm>
+            <a:off x="4087527" y="2924944"/>
+            <a:ext cx="1735860" cy="338554"/>
+          </a:xfrm>
+          <a:prstGeom prst="rect">
+            <a:avLst/>
+          </a:prstGeom>
+          <a:noFill/>
+        </p:spPr>
+        <p:txBody>
+          <a:bodyPr wrap="none" rtlCol="0">
+            <a:spAutoFit/>
+          </a:bodyPr>
+          <a:lstStyle/>
+          <a:p>
+            <a:r>
+              <a:rPr lang="de-DE" sz="1600" dirty="0" smtClean="0"/>
+              <a:t>Diffusion Operator</a:t>
+            </a:r>
+            <a:endParaRPr lang="de-DE" sz="1600" dirty="0"/>
+          </a:p>
+        </p:txBody>
+      </p:sp>
+      <p:sp>
+        <p:nvSpPr>
+          <p:cNvPr id="63" name="Textfeld 62"/>
+          <p:cNvSpPr txBox="1"/>
+          <p:nvPr/>
+        </p:nvSpPr>
+        <p:spPr>
+          <a:xfrm>
+            <a:off x="6061867" y="2924944"/>
+            <a:ext cx="886397" cy="338554"/>
+          </a:xfrm>
+          <a:prstGeom prst="rect">
+            <a:avLst/>
+          </a:prstGeom>
+          <a:noFill/>
+        </p:spPr>
+        <p:txBody>
+          <a:bodyPr wrap="none" rtlCol="0">
+            <a:spAutoFit/>
+          </a:bodyPr>
+          <a:lstStyle/>
+          <a:p>
+            <a:r>
+              <a:rPr lang="de-DE" sz="1600" dirty="0" err="1" smtClean="0"/>
+              <a:t>Readout</a:t>
+            </a:r>
+            <a:endParaRPr lang="de-DE" sz="1600" dirty="0"/>
+          </a:p>
+        </p:txBody>
+      </p:sp>
+      <p:sp>
+        <p:nvSpPr>
+          <p:cNvPr id="64" name="Geschweifte Klammer links 63"/>
+          <p:cNvSpPr/>
+          <p:nvPr/>
+        </p:nvSpPr>
+        <p:spPr>
+          <a:xfrm rot="5400000">
+            <a:off x="791580" y="2672916"/>
+            <a:ext cx="216024" cy="1440160"/>
+          </a:xfrm>
+          <a:prstGeom prst="leftBrace">
+            <a:avLst/>
+          </a:prstGeom>
+          <a:ln w="38100">
+            <a:solidFill>
+              <a:schemeClr val="tx1"/>
+            </a:solidFill>
+          </a:ln>
+        </p:spPr>
+        <p:style>
+          <a:lnRef idx="1">
+            <a:schemeClr val="accent1"/>
+          </a:lnRef>
+          <a:fillRef idx="0">
+            <a:schemeClr val="accent1"/>
+          </a:fillRef>
+          <a:effectRef idx="0">
+            <a:schemeClr val="accent1"/>
+          </a:effectRef>
+          <a:fontRef idx="minor">
+            <a:schemeClr val="tx1"/>
+          </a:fontRef>
+        </p:style>
+        <p:txBody>
+          <a:bodyPr rtlCol="0" anchor="ctr"/>
+          <a:lstStyle/>
+          <a:p>
+            <a:pPr algn="ctr"/>
+            <a:endParaRPr lang="de-DE" dirty="0"/>
+          </a:p>
+        </p:txBody>
+      </p:sp>
+      <p:sp>
+        <p:nvSpPr>
+          <p:cNvPr id="65" name="Geschweifte Klammer links 64"/>
+          <p:cNvSpPr/>
+          <p:nvPr/>
+        </p:nvSpPr>
+        <p:spPr>
+          <a:xfrm rot="5400000">
+            <a:off x="2591780" y="2456892"/>
+            <a:ext cx="216024" cy="1872208"/>
+          </a:xfrm>
+          <a:prstGeom prst="leftBrace">
+            <a:avLst/>
+          </a:prstGeom>
+          <a:ln w="38100">
+            <a:solidFill>
+              <a:schemeClr val="tx1"/>
+            </a:solidFill>
+          </a:ln>
+        </p:spPr>
+        <p:style>
+          <a:lnRef idx="1">
+            <a:schemeClr val="accent1"/>
+          </a:lnRef>
+          <a:fillRef idx="0">
+            <a:schemeClr val="accent1"/>
+          </a:fillRef>
+          <a:effectRef idx="0">
+            <a:schemeClr val="accent1"/>
+          </a:effectRef>
+          <a:fontRef idx="minor">
+            <a:schemeClr val="tx1"/>
+          </a:fontRef>
+        </p:style>
+        <p:txBody>
+          <a:bodyPr rtlCol="0" anchor="ctr"/>
+          <a:lstStyle/>
+          <a:p>
+            <a:pPr algn="ctr"/>
+            <a:endParaRPr lang="de-DE" dirty="0"/>
+          </a:p>
+        </p:txBody>
+      </p:sp>
+      <p:sp>
+        <p:nvSpPr>
+          <p:cNvPr id="66" name="Geschweifte Klammer links 65"/>
+          <p:cNvSpPr/>
+          <p:nvPr/>
+        </p:nvSpPr>
+        <p:spPr>
+          <a:xfrm rot="5400000">
+            <a:off x="4788024" y="2492896"/>
+            <a:ext cx="216024" cy="1800200"/>
+          </a:xfrm>
+          <a:prstGeom prst="leftBrace">
+            <a:avLst/>
+          </a:prstGeom>
+          <a:ln w="38100">
+            <a:solidFill>
+              <a:schemeClr val="tx1"/>
+            </a:solidFill>
+          </a:ln>
+        </p:spPr>
+        <p:style>
+          <a:lnRef idx="1">
+            <a:schemeClr val="accent1"/>
+          </a:lnRef>
+          <a:fillRef idx="0">
+            <a:schemeClr val="accent1"/>
+          </a:fillRef>
+          <a:effectRef idx="0">
+            <a:schemeClr val="accent1"/>
+          </a:effectRef>
+          <a:fontRef idx="minor">
+            <a:schemeClr val="tx1"/>
+          </a:fontRef>
+        </p:style>
+        <p:txBody>
+          <a:bodyPr rtlCol="0" anchor="ctr"/>
+          <a:lstStyle/>
+          <a:p>
+            <a:pPr algn="ctr"/>
+            <a:endParaRPr lang="de-DE" dirty="0"/>
+          </a:p>
+        </p:txBody>
+      </p:sp>
+      <p:sp>
+        <p:nvSpPr>
+          <p:cNvPr id="67" name="Geschweifte Klammer links 66"/>
+          <p:cNvSpPr/>
+          <p:nvPr/>
+        </p:nvSpPr>
+        <p:spPr>
+          <a:xfrm rot="5400000">
+            <a:off x="6372200" y="3068960"/>
+            <a:ext cx="216024" cy="648072"/>
+          </a:xfrm>
+          <a:prstGeom prst="leftBrace">
+            <a:avLst/>
+          </a:prstGeom>
+          <a:ln w="38100">
+            <a:solidFill>
+              <a:schemeClr val="tx1"/>
+            </a:solidFill>
+          </a:ln>
+        </p:spPr>
+        <p:style>
+          <a:lnRef idx="1">
+            <a:schemeClr val="accent1"/>
+          </a:lnRef>
+          <a:fillRef idx="0">
+            <a:schemeClr val="accent1"/>
+          </a:fillRef>
+          <a:effectRef idx="0">
+            <a:schemeClr val="accent1"/>
+          </a:effectRef>
+          <a:fontRef idx="minor">
+            <a:schemeClr val="tx1"/>
+          </a:fontRef>
+        </p:style>
+        <p:txBody>
+          <a:bodyPr rtlCol="0" anchor="ctr"/>
+          <a:lstStyle/>
+          <a:p>
+            <a:pPr algn="ctr"/>
+            <a:endParaRPr lang="de-DE" dirty="0"/>
+          </a:p>
+        </p:txBody>
+      </p:sp>
+      <p:sp>
+        <p:nvSpPr>
+          <p:cNvPr id="34" name="Gewitterblitz 33"/>
+          <p:cNvSpPr/>
+          <p:nvPr/>
+        </p:nvSpPr>
+        <p:spPr>
+          <a:xfrm rot="429266">
+            <a:off x="3668931" y="3301729"/>
+            <a:ext cx="288032" cy="1800200"/>
+          </a:xfrm>
+          <a:prstGeom prst="lightningBolt">
+            <a:avLst/>
+          </a:prstGeom>
+          <a:solidFill>
+            <a:schemeClr val="bg1"/>
+          </a:solidFill>
+          <a:ln>
+            <a:solidFill>
+              <a:schemeClr val="tx1"/>
+            </a:solidFill>
+          </a:ln>
+        </p:spPr>
+        <p:style>
+          <a:lnRef idx="2">
+            <a:schemeClr val="accent1">
+              <a:shade val="50000"/>
+            </a:schemeClr>
+          </a:lnRef>
+          <a:fillRef idx="1">
+            <a:schemeClr val="accent1"/>
+          </a:fillRef>
+          <a:effectRef idx="0">
+            <a:schemeClr val="accent1"/>
+          </a:effectRef>
+          <a:fontRef idx="minor">
+            <a:schemeClr val="lt1"/>
+          </a:fontRef>
+        </p:style>
+        <p:txBody>
+          <a:bodyPr rtlCol="0" anchor="ctr"/>
+          <a:lstStyle/>
+          <a:p>
+            <a:pPr algn="ctr"/>
+            <a:endParaRPr lang="de-DE"/>
+          </a:p>
+        </p:txBody>
+      </p:sp>
+      <p:sp>
+        <p:nvSpPr>
+          <p:cNvPr id="35" name="Gewitterblitz 34"/>
+          <p:cNvSpPr/>
+          <p:nvPr/>
+        </p:nvSpPr>
+        <p:spPr>
+          <a:xfrm rot="429266">
+            <a:off x="5829171" y="3276457"/>
+            <a:ext cx="288032" cy="1800200"/>
+          </a:xfrm>
+          <a:prstGeom prst="lightningBolt">
+            <a:avLst/>
+          </a:prstGeom>
+          <a:solidFill>
+            <a:schemeClr val="bg1"/>
+          </a:solidFill>
+          <a:ln>
+            <a:solidFill>
+              <a:schemeClr val="tx1"/>
+            </a:solidFill>
+          </a:ln>
+        </p:spPr>
+        <p:style>
+          <a:lnRef idx="2">
+            <a:schemeClr val="accent1">
+              <a:shade val="50000"/>
+            </a:schemeClr>
+          </a:lnRef>
+          <a:fillRef idx="1">
+            <a:schemeClr val="accent1"/>
+          </a:fillRef>
+          <a:effectRef idx="0">
+            <a:schemeClr val="accent1"/>
+          </a:effectRef>
+          <a:fontRef idx="minor">
+            <a:schemeClr val="lt1"/>
+          </a:fontRef>
+        </p:style>
+        <p:txBody>
+          <a:bodyPr rtlCol="0" anchor="ctr"/>
+          <a:lstStyle/>
+          <a:p>
+            <a:pPr algn="ctr"/>
+            <a:endParaRPr lang="de-DE"/>
+          </a:p>
+        </p:txBody>
+      </p:sp>
+      <p:cxnSp>
+        <p:nvCxnSpPr>
+          <p:cNvPr id="54" name="Gerade Verbindung 53"/>
+          <p:cNvCxnSpPr/>
+          <p:nvPr/>
+        </p:nvCxnSpPr>
+        <p:spPr>
+          <a:xfrm>
+            <a:off x="1658584" y="3573016"/>
+            <a:ext cx="0" cy="1440160"/>
+          </a:xfrm>
+          <a:prstGeom prst="line">
+            <a:avLst/>
+          </a:prstGeom>
+          <a:ln>
+            <a:solidFill>
+              <a:schemeClr val="tx1"/>
+            </a:solidFill>
+            <a:prstDash val="dash"/>
+          </a:ln>
+        </p:spPr>
+        <p:style>
+          <a:lnRef idx="1">
+            <a:schemeClr val="accent1"/>
+          </a:lnRef>
+          <a:fillRef idx="0">
+            <a:schemeClr val="accent1"/>
+          </a:fillRef>
+          <a:effectRef idx="0">
+            <a:schemeClr val="accent1"/>
+          </a:effectRef>
+          <a:fontRef idx="minor">
+            <a:schemeClr val="tx1"/>
+          </a:fontRef>
+        </p:style>
+      </p:cxnSp>
+      <p:cxnSp>
+        <p:nvCxnSpPr>
+          <p:cNvPr id="75" name="Gerade Verbindung 74"/>
+          <p:cNvCxnSpPr/>
+          <p:nvPr/>
+        </p:nvCxnSpPr>
+        <p:spPr>
+          <a:xfrm>
+            <a:off x="2843808" y="3573016"/>
+            <a:ext cx="0" cy="1440160"/>
+          </a:xfrm>
+          <a:prstGeom prst="line">
+            <a:avLst/>
+          </a:prstGeom>
+          <a:ln>
+            <a:solidFill>
+              <a:schemeClr val="tx1"/>
+            </a:solidFill>
+            <a:prstDash val="dash"/>
+          </a:ln>
+        </p:spPr>
+        <p:style>
+          <a:lnRef idx="1">
+            <a:schemeClr val="accent1"/>
+          </a:lnRef>
+          <a:fillRef idx="0">
+            <a:schemeClr val="accent1"/>
+          </a:fillRef>
+          <a:effectRef idx="0">
+            <a:schemeClr val="accent1"/>
+          </a:effectRef>
+          <a:fontRef idx="minor">
+            <a:schemeClr val="tx1"/>
+          </a:fontRef>
+        </p:style>
+      </p:cxnSp>
+      <p:cxnSp>
+        <p:nvCxnSpPr>
+          <p:cNvPr id="77" name="Gerade Verbindung 76"/>
+          <p:cNvCxnSpPr/>
+          <p:nvPr/>
+        </p:nvCxnSpPr>
+        <p:spPr>
+          <a:xfrm>
+            <a:off x="3635896" y="3573016"/>
+            <a:ext cx="0" cy="1440160"/>
+          </a:xfrm>
+          <a:prstGeom prst="line">
+            <a:avLst/>
+          </a:prstGeom>
+          <a:ln>
+            <a:solidFill>
+              <a:schemeClr val="tx1"/>
+            </a:solidFill>
+            <a:prstDash val="dash"/>
+          </a:ln>
+        </p:spPr>
+        <p:style>
+          <a:lnRef idx="1">
+            <a:schemeClr val="accent1"/>
+          </a:lnRef>
+          <a:fillRef idx="0">
+            <a:schemeClr val="accent1"/>
+          </a:fillRef>
+          <a:effectRef idx="0">
+            <a:schemeClr val="accent1"/>
+          </a:effectRef>
+          <a:fontRef idx="minor">
+            <a:schemeClr val="tx1"/>
+          </a:fontRef>
+        </p:style>
+      </p:cxnSp>
+      <p:cxnSp>
+        <p:nvCxnSpPr>
+          <p:cNvPr id="78" name="Gerade Verbindung 77"/>
+          <p:cNvCxnSpPr/>
+          <p:nvPr/>
+        </p:nvCxnSpPr>
+        <p:spPr>
+          <a:xfrm>
+            <a:off x="5004048" y="3573016"/>
+            <a:ext cx="0" cy="1440160"/>
+          </a:xfrm>
+          <a:prstGeom prst="line">
+            <a:avLst/>
+          </a:prstGeom>
+          <a:ln>
+            <a:solidFill>
+              <a:schemeClr val="tx1"/>
+            </a:solidFill>
+            <a:prstDash val="dash"/>
+          </a:ln>
+        </p:spPr>
+        <p:style>
+          <a:lnRef idx="1">
+            <a:schemeClr val="accent1"/>
+          </a:lnRef>
+          <a:fillRef idx="0">
+            <a:schemeClr val="accent1"/>
+          </a:fillRef>
+          <a:effectRef idx="0">
+            <a:schemeClr val="accent1"/>
+          </a:effectRef>
+          <a:fontRef idx="minor">
+            <a:schemeClr val="tx1"/>
+          </a:fontRef>
+        </p:style>
+      </p:cxnSp>
+      <p:cxnSp>
+        <p:nvCxnSpPr>
+          <p:cNvPr id="79" name="Gerade Verbindung 78"/>
+          <p:cNvCxnSpPr/>
+          <p:nvPr/>
+        </p:nvCxnSpPr>
+        <p:spPr>
+          <a:xfrm>
+            <a:off x="5796136" y="3573016"/>
+            <a:ext cx="0" cy="1440160"/>
+          </a:xfrm>
+          <a:prstGeom prst="line">
+            <a:avLst/>
+          </a:prstGeom>
+          <a:ln>
+            <a:solidFill>
+              <a:schemeClr val="tx1"/>
+            </a:solidFill>
+            <a:prstDash val="dash"/>
+          </a:ln>
+        </p:spPr>
+        <p:style>
+          <a:lnRef idx="1">
+            <a:schemeClr val="accent1"/>
+          </a:lnRef>
+          <a:fillRef idx="0">
+            <a:schemeClr val="accent1"/>
+          </a:fillRef>
+          <a:effectRef idx="0">
+            <a:schemeClr val="accent1"/>
+          </a:effectRef>
+          <a:fontRef idx="minor">
+            <a:schemeClr val="tx1"/>
+          </a:fontRef>
+        </p:style>
+      </p:cxnSp>
+      <p:cxnSp>
+        <p:nvCxnSpPr>
+          <p:cNvPr id="80" name="Gerade Verbindung 79"/>
+          <p:cNvCxnSpPr/>
+          <p:nvPr/>
+        </p:nvCxnSpPr>
+        <p:spPr>
+          <a:xfrm>
+            <a:off x="6876256" y="3573016"/>
+            <a:ext cx="0" cy="1440160"/>
+          </a:xfrm>
+          <a:prstGeom prst="line">
+            <a:avLst/>
+          </a:prstGeom>
+          <a:ln>
+            <a:solidFill>
+              <a:schemeClr val="tx1"/>
+            </a:solidFill>
+            <a:prstDash val="dash"/>
+          </a:ln>
+        </p:spPr>
+        <p:style>
+          <a:lnRef idx="1">
+            <a:schemeClr val="accent1"/>
+          </a:lnRef>
+          <a:fillRef idx="0">
+            <a:schemeClr val="accent1"/>
+          </a:fillRef>
+          <a:effectRef idx="0">
+            <a:schemeClr val="accent1"/>
+          </a:effectRef>
+          <a:fontRef idx="minor">
+            <a:schemeClr val="tx1"/>
+          </a:fontRef>
+        </p:style>
+      </p:cxnSp>
     </p:spTree>
   </p:cSld>
   <p:clrMapOvr>

</xml_diff>

<commit_message>
Extended the section on the error analysis of the Grover search algorithm and added plots showing the readout matrix and errors of the two-qubit processor. Added more content to the section on single-qubit operations and the qubit parameters.
</commit_message>
<xml_diff>
--- a/material/papers/grover/classical_reversible_algorithm.pptx
+++ b/material/papers/grover/classical_reversible_algorithm.pptx
@@ -7432,6 +7432,184 @@
           </a:p>
         </p:txBody>
       </p:sp>
+      <p:grpSp>
+        <p:nvGrpSpPr>
+          <p:cNvPr id="100" name="Gruppieren 99"/>
+          <p:cNvGrpSpPr/>
+          <p:nvPr/>
+        </p:nvGrpSpPr>
+        <p:grpSpPr>
+          <a:xfrm>
+            <a:off x="7775977" y="2368336"/>
+            <a:ext cx="432048" cy="360040"/>
+            <a:chOff x="755576" y="359551"/>
+            <a:chExt cx="432048" cy="360040"/>
+          </a:xfrm>
+        </p:grpSpPr>
+        <p:sp>
+          <p:nvSpPr>
+            <p:cNvPr id="101" name="Freihandform 100"/>
+            <p:cNvSpPr/>
+            <p:nvPr/>
+          </p:nvSpPr>
+          <p:spPr>
+            <a:xfrm>
+              <a:off x="755576" y="359551"/>
+              <a:ext cx="288032" cy="360040"/>
+            </a:xfrm>
+            <a:custGeom>
+              <a:avLst/>
+              <a:gdLst>
+                <a:gd name="connsiteX0" fmla="*/ 35859 w 403412"/>
+                <a:gd name="connsiteY0" fmla="*/ 0 h 403412"/>
+                <a:gd name="connsiteX1" fmla="*/ 0 w 403412"/>
+                <a:gd name="connsiteY1" fmla="*/ 403412 h 403412"/>
+                <a:gd name="connsiteX2" fmla="*/ 403412 w 403412"/>
+                <a:gd name="connsiteY2" fmla="*/ 268941 h 403412"/>
+                <a:gd name="connsiteX3" fmla="*/ 35859 w 403412"/>
+                <a:gd name="connsiteY3" fmla="*/ 0 h 403412"/>
+                <a:gd name="connsiteX0" fmla="*/ 35859 w 328464"/>
+                <a:gd name="connsiteY0" fmla="*/ 0 h 403412"/>
+                <a:gd name="connsiteX1" fmla="*/ 0 w 328464"/>
+                <a:gd name="connsiteY1" fmla="*/ 403412 h 403412"/>
+                <a:gd name="connsiteX2" fmla="*/ 328464 w 328464"/>
+                <a:gd name="connsiteY2" fmla="*/ 190092 h 403412"/>
+                <a:gd name="connsiteX3" fmla="*/ 35859 w 328464"/>
+                <a:gd name="connsiteY3" fmla="*/ 0 h 403412"/>
+                <a:gd name="connsiteX0" fmla="*/ 0 w 360040"/>
+                <a:gd name="connsiteY0" fmla="*/ 0 h 429344"/>
+                <a:gd name="connsiteX1" fmla="*/ 31576 w 360040"/>
+                <a:gd name="connsiteY1" fmla="*/ 429344 h 429344"/>
+                <a:gd name="connsiteX2" fmla="*/ 360040 w 360040"/>
+                <a:gd name="connsiteY2" fmla="*/ 216024 h 429344"/>
+                <a:gd name="connsiteX3" fmla="*/ 0 w 360040"/>
+                <a:gd name="connsiteY3" fmla="*/ 0 h 429344"/>
+                <a:gd name="connsiteX0" fmla="*/ 0 w 360040"/>
+                <a:gd name="connsiteY0" fmla="*/ 0 h 432048"/>
+                <a:gd name="connsiteX1" fmla="*/ 0 w 360040"/>
+                <a:gd name="connsiteY1" fmla="*/ 432048 h 432048"/>
+                <a:gd name="connsiteX2" fmla="*/ 360040 w 360040"/>
+                <a:gd name="connsiteY2" fmla="*/ 216024 h 432048"/>
+                <a:gd name="connsiteX3" fmla="*/ 0 w 360040"/>
+                <a:gd name="connsiteY3" fmla="*/ 0 h 432048"/>
+              </a:gdLst>
+              <a:ahLst/>
+              <a:cxnLst>
+                <a:cxn ang="0">
+                  <a:pos x="connsiteX0" y="connsiteY0"/>
+                </a:cxn>
+                <a:cxn ang="0">
+                  <a:pos x="connsiteX1" y="connsiteY1"/>
+                </a:cxn>
+                <a:cxn ang="0">
+                  <a:pos x="connsiteX2" y="connsiteY2"/>
+                </a:cxn>
+                <a:cxn ang="0">
+                  <a:pos x="connsiteX3" y="connsiteY3"/>
+                </a:cxn>
+              </a:cxnLst>
+              <a:rect l="l" t="t" r="r" b="b"/>
+              <a:pathLst>
+                <a:path w="360040" h="432048">
+                  <a:moveTo>
+                    <a:pt x="0" y="0"/>
+                  </a:moveTo>
+                  <a:lnTo>
+                    <a:pt x="0" y="432048"/>
+                  </a:lnTo>
+                  <a:lnTo>
+                    <a:pt x="360040" y="216024"/>
+                  </a:lnTo>
+                  <a:lnTo>
+                    <a:pt x="0" y="0"/>
+                  </a:lnTo>
+                  <a:close/>
+                </a:path>
+              </a:pathLst>
+            </a:custGeom>
+            <a:solidFill>
+              <a:schemeClr val="bg1"/>
+            </a:solidFill>
+            <a:ln>
+              <a:solidFill>
+                <a:schemeClr val="tx1"/>
+              </a:solidFill>
+            </a:ln>
+          </p:spPr>
+          <p:style>
+            <a:lnRef idx="2">
+              <a:schemeClr val="accent1">
+                <a:shade val="50000"/>
+              </a:schemeClr>
+            </a:lnRef>
+            <a:fillRef idx="1">
+              <a:schemeClr val="accent1"/>
+            </a:fillRef>
+            <a:effectRef idx="0">
+              <a:schemeClr val="accent1"/>
+            </a:effectRef>
+            <a:fontRef idx="minor">
+              <a:schemeClr val="lt1"/>
+            </a:fontRef>
+          </p:style>
+          <p:txBody>
+            <a:bodyPr rtlCol="0" anchor="ctr"/>
+            <a:lstStyle/>
+            <a:p>
+              <a:pPr algn="ctr"/>
+              <a:endParaRPr lang="de-DE"/>
+            </a:p>
+          </p:txBody>
+        </p:sp>
+        <p:sp>
+          <p:nvSpPr>
+            <p:cNvPr id="102" name="Ellipse 101"/>
+            <p:cNvSpPr/>
+            <p:nvPr/>
+          </p:nvSpPr>
+          <p:spPr>
+            <a:xfrm>
+              <a:off x="1043608" y="476672"/>
+              <a:ext cx="144016" cy="144016"/>
+            </a:xfrm>
+            <a:prstGeom prst="ellipse">
+              <a:avLst/>
+            </a:prstGeom>
+            <a:solidFill>
+              <a:schemeClr val="bg1"/>
+            </a:solidFill>
+            <a:ln>
+              <a:solidFill>
+                <a:schemeClr val="tx1"/>
+              </a:solidFill>
+            </a:ln>
+          </p:spPr>
+          <p:style>
+            <a:lnRef idx="2">
+              <a:schemeClr val="accent1">
+                <a:shade val="50000"/>
+              </a:schemeClr>
+            </a:lnRef>
+            <a:fillRef idx="1">
+              <a:schemeClr val="accent1"/>
+            </a:fillRef>
+            <a:effectRef idx="0">
+              <a:schemeClr val="accent1"/>
+            </a:effectRef>
+            <a:fontRef idx="minor">
+              <a:schemeClr val="lt1"/>
+            </a:fontRef>
+          </p:style>
+          <p:txBody>
+            <a:bodyPr rtlCol="0" anchor="ctr"/>
+            <a:lstStyle/>
+            <a:p>
+              <a:pPr algn="ctr"/>
+              <a:endParaRPr lang="de-DE"/>
+            </a:p>
+          </p:txBody>
+        </p:sp>
+      </p:grpSp>
     </p:spTree>
   </p:cSld>
   <p:clrMapOvr>

</xml_diff>